<commit_message>
added more slides and demos to the async js lecture
</commit_message>
<xml_diff>
--- a/JS Fundamentals/12. Async-JS/AsyncJS.pptx
+++ b/JS Fundamentals/12. Async-JS/AsyncJS.pptx
@@ -5,10 +5,10 @@
     <p:sldMasterId id="2147484157" r:id="rId1"/>
   </p:sldMasterIdLst>
   <p:notesMasterIdLst>
-    <p:notesMasterId r:id="rId21"/>
+    <p:notesMasterId r:id="rId24"/>
   </p:notesMasterIdLst>
   <p:handoutMasterIdLst>
-    <p:handoutMasterId r:id="rId22"/>
+    <p:handoutMasterId r:id="rId25"/>
   </p:handoutMasterIdLst>
   <p:sldIdLst>
     <p:sldId id="256" r:id="rId2"/>
@@ -28,8 +28,11 @@
     <p:sldId id="400" r:id="rId16"/>
     <p:sldId id="401" r:id="rId17"/>
     <p:sldId id="402" r:id="rId18"/>
-    <p:sldId id="266" r:id="rId19"/>
-    <p:sldId id="278" r:id="rId20"/>
+    <p:sldId id="403" r:id="rId19"/>
+    <p:sldId id="404" r:id="rId20"/>
+    <p:sldId id="405" r:id="rId21"/>
+    <p:sldId id="266" r:id="rId22"/>
+    <p:sldId id="278" r:id="rId23"/>
   </p:sldIdLst>
   <p:sldSz cx="12192000" cy="6858000"/>
   <p:notesSz cx="6858000" cy="9144000"/>
@@ -232,7 +235,7 @@
           <a:p>
             <a:fld id="{D10AF160-CD5A-4A77-96B0-C85B80371432}" type="datetimeFigureOut">
               <a:rPr lang="en-US" smtClean="0"/>
-              <a:t>05-Jul-16</a:t>
+              <a:t>06-Jul-16</a:t>
             </a:fld>
             <a:endParaRPr lang="en-US"/>
           </a:p>
@@ -397,7 +400,7 @@
           <a:p>
             <a:fld id="{F6A950C5-F15E-44EA-AF6A-22227443235C}" type="datetimeFigureOut">
               <a:rPr lang="en-US" smtClean="0"/>
-              <a:t>05-Jul-16</a:t>
+              <a:t>06-Jul-16</a:t>
             </a:fld>
             <a:endParaRPr lang="en-US"/>
           </a:p>
@@ -1170,7 +1173,7 @@
           <a:p>
             <a:fld id="{6F66794D-9D79-4AC5-96DA-597EA4BF2704}" type="datetimeFigureOut">
               <a:rPr lang="en-US" smtClean="0"/>
-              <a:t>05-Jul-16</a:t>
+              <a:t>06-Jul-16</a:t>
             </a:fld>
             <a:endParaRPr lang="en-US"/>
           </a:p>
@@ -1504,7 +1507,7 @@
           <a:p>
             <a:fld id="{6F66794D-9D79-4AC5-96DA-597EA4BF2704}" type="datetimeFigureOut">
               <a:rPr lang="en-US" smtClean="0"/>
-              <a:t>05-Jul-16</a:t>
+              <a:t>06-Jul-16</a:t>
             </a:fld>
             <a:endParaRPr lang="en-US"/>
           </a:p>
@@ -1760,7 +1763,7 @@
           <a:p>
             <a:fld id="{6F66794D-9D79-4AC5-96DA-597EA4BF2704}" type="datetimeFigureOut">
               <a:rPr lang="en-US" smtClean="0"/>
-              <a:t>05-Jul-16</a:t>
+              <a:t>06-Jul-16</a:t>
             </a:fld>
             <a:endParaRPr lang="en-US"/>
           </a:p>
@@ -2308,7 +2311,7 @@
           <a:p>
             <a:fld id="{6F66794D-9D79-4AC5-96DA-597EA4BF2704}" type="datetimeFigureOut">
               <a:rPr lang="en-US" smtClean="0"/>
-              <a:t>05-Jul-16</a:t>
+              <a:t>06-Jul-16</a:t>
             </a:fld>
             <a:endParaRPr lang="en-US"/>
           </a:p>
@@ -2564,7 +2567,7 @@
           <a:p>
             <a:fld id="{6F66794D-9D79-4AC5-96DA-597EA4BF2704}" type="datetimeFigureOut">
               <a:rPr lang="en-US" smtClean="0"/>
-              <a:t>05-Jul-16</a:t>
+              <a:t>06-Jul-16</a:t>
             </a:fld>
             <a:endParaRPr lang="en-US"/>
           </a:p>
@@ -3104,7 +3107,7 @@
           <a:p>
             <a:fld id="{6F66794D-9D79-4AC5-96DA-597EA4BF2704}" type="datetimeFigureOut">
               <a:rPr lang="en-US" smtClean="0"/>
-              <a:t>05-Jul-16</a:t>
+              <a:t>06-Jul-16</a:t>
             </a:fld>
             <a:endParaRPr lang="en-US"/>
           </a:p>
@@ -3409,7 +3412,7 @@
           <a:p>
             <a:fld id="{6F66794D-9D79-4AC5-96DA-597EA4BF2704}" type="datetimeFigureOut">
               <a:rPr lang="en-US" smtClean="0"/>
-              <a:t>05-Jul-16</a:t>
+              <a:t>06-Jul-16</a:t>
             </a:fld>
             <a:endParaRPr lang="en-US"/>
           </a:p>
@@ -3591,7 +3594,7 @@
           <a:p>
             <a:fld id="{6F66794D-9D79-4AC5-96DA-597EA4BF2704}" type="datetimeFigureOut">
               <a:rPr lang="en-US" smtClean="0"/>
-              <a:t>05-Jul-16</a:t>
+              <a:t>06-Jul-16</a:t>
             </a:fld>
             <a:endParaRPr lang="en-US"/>
           </a:p>
@@ -3779,7 +3782,7 @@
           <a:p>
             <a:fld id="{6F66794D-9D79-4AC5-96DA-597EA4BF2704}" type="datetimeFigureOut">
               <a:rPr lang="en-US" smtClean="0"/>
-              <a:t>05-Jul-16</a:t>
+              <a:t>06-Jul-16</a:t>
             </a:fld>
             <a:endParaRPr lang="en-US"/>
           </a:p>
@@ -3957,7 +3960,7 @@
           <a:p>
             <a:fld id="{6F66794D-9D79-4AC5-96DA-597EA4BF2704}" type="datetimeFigureOut">
               <a:rPr lang="en-US" smtClean="0"/>
-              <a:t>05-Jul-16</a:t>
+              <a:t>06-Jul-16</a:t>
             </a:fld>
             <a:endParaRPr lang="en-US"/>
           </a:p>
@@ -4246,7 +4249,7 @@
           <a:p>
             <a:fld id="{6F66794D-9D79-4AC5-96DA-597EA4BF2704}" type="datetimeFigureOut">
               <a:rPr lang="en-US" smtClean="0"/>
-              <a:t>05-Jul-16</a:t>
+              <a:t>06-Jul-16</a:t>
             </a:fld>
             <a:endParaRPr lang="en-US"/>
           </a:p>
@@ -4551,7 +4554,7 @@
           <a:p>
             <a:fld id="{6F66794D-9D79-4AC5-96DA-597EA4BF2704}" type="datetimeFigureOut">
               <a:rPr lang="en-US" smtClean="0"/>
-              <a:t>05-Jul-16</a:t>
+              <a:t>06-Jul-16</a:t>
             </a:fld>
             <a:endParaRPr lang="en-US"/>
           </a:p>
@@ -5031,7 +5034,7 @@
           <a:p>
             <a:fld id="{6F66794D-9D79-4AC5-96DA-597EA4BF2704}" type="datetimeFigureOut">
               <a:rPr lang="en-US" smtClean="0"/>
-              <a:t>05-Jul-16</a:t>
+              <a:t>06-Jul-16</a:t>
             </a:fld>
             <a:endParaRPr lang="en-US"/>
           </a:p>
@@ -5187,7 +5190,7 @@
           <a:p>
             <a:fld id="{6F66794D-9D79-4AC5-96DA-597EA4BF2704}" type="datetimeFigureOut">
               <a:rPr lang="en-US" smtClean="0"/>
-              <a:t>05-Jul-16</a:t>
+              <a:t>06-Jul-16</a:t>
             </a:fld>
             <a:endParaRPr lang="en-US"/>
           </a:p>
@@ -5290,7 +5293,7 @@
           <a:p>
             <a:fld id="{6F66794D-9D79-4AC5-96DA-597EA4BF2704}" type="datetimeFigureOut">
               <a:rPr lang="en-US" smtClean="0"/>
-              <a:t>05-Jul-16</a:t>
+              <a:t>06-Jul-16</a:t>
             </a:fld>
             <a:endParaRPr lang="en-US"/>
           </a:p>
@@ -5581,7 +5584,7 @@
           <a:p>
             <a:fld id="{6F66794D-9D79-4AC5-96DA-597EA4BF2704}" type="datetimeFigureOut">
               <a:rPr lang="en-US" smtClean="0"/>
-              <a:t>05-Jul-16</a:t>
+              <a:t>06-Jul-16</a:t>
             </a:fld>
             <a:endParaRPr lang="en-US"/>
           </a:p>
@@ -5880,7 +5883,7 @@
           <a:p>
             <a:fld id="{6F66794D-9D79-4AC5-96DA-597EA4BF2704}" type="datetimeFigureOut">
               <a:rPr lang="en-US" smtClean="0"/>
-              <a:t>05-Jul-16</a:t>
+              <a:t>06-Jul-16</a:t>
             </a:fld>
             <a:endParaRPr lang="en-US"/>
           </a:p>
@@ -6418,7 +6421,7 @@
           <a:p>
             <a:fld id="{6F66794D-9D79-4AC5-96DA-597EA4BF2704}" type="datetimeFigureOut">
               <a:rPr lang="en-US" smtClean="0"/>
-              <a:t>05-Jul-16</a:t>
+              <a:t>06-Jul-16</a:t>
             </a:fld>
             <a:endParaRPr lang="en-US"/>
           </a:p>
@@ -8317,6 +8320,23 @@
               <a:rPr lang="en-US" dirty="0" smtClean="0"/>
               <a:t>jQuery</a:t>
             </a:r>
+            <a:endParaRPr lang="en-US" dirty="0" smtClean="0">
+              <a:hlinkClick r:id="rId2"/>
+            </a:endParaRPr>
+          </a:p>
+          <a:p>
+            <a:r>
+              <a:rPr lang="en-US" dirty="0" smtClean="0">
+                <a:hlinkClick r:id="rId2"/>
+              </a:rPr>
+              <a:t>DEMO</a:t>
+            </a:r>
+            <a:r>
+              <a:rPr lang="en-US" dirty="0">
+                <a:hlinkClick r:id="rId2"/>
+              </a:rPr>
+              <a:t>S</a:t>
+            </a:r>
             <a:endParaRPr lang="en-US" dirty="0"/>
           </a:p>
         </p:txBody>
@@ -8339,6 +8359,13 @@
       <p:transition spd="slow"/>
     </mc:Fallback>
   </mc:AlternateContent>
+  <p:timing>
+    <p:tnLst>
+      <p:par>
+        <p:cTn id="1" dur="indefinite" restart="never" nodeType="tmRoot"/>
+      </p:par>
+    </p:tnLst>
+  </p:timing>
 </p:sld>
 </file>
 
@@ -9074,6 +9101,13 @@
       <p:transition spd="slow"/>
     </mc:Fallback>
   </mc:AlternateContent>
+  <p:timing>
+    <p:tnLst>
+      <p:par>
+        <p:cTn id="1" dur="indefinite" restart="never" nodeType="tmRoot"/>
+      </p:par>
+    </p:tnLst>
+  </p:timing>
 </p:sld>
 </file>
 
@@ -9162,16 +9196,10 @@
               <a:t>url</a:t>
             </a:r>
             <a:r>
-              <a:rPr lang="en-US" smtClean="0">
-                <a:hlinkClick r:id="rId2"/>
-              </a:rPr>
-              <a:t> [, </a:t>
-            </a:r>
-            <a:r>
               <a:rPr lang="en-US" dirty="0" smtClean="0">
                 <a:hlinkClick r:id="rId2"/>
               </a:rPr>
-              <a:t>options])</a:t>
+              <a:t> [, options])</a:t>
             </a:r>
             <a:endParaRPr lang="en-US" dirty="0" smtClean="0"/>
           </a:p>
@@ -9192,6 +9220,16 @@
             <a:r>
               <a:rPr lang="bg-BG" dirty="0" smtClean="0"/>
               <a:t>заявка</a:t>
+            </a:r>
+            <a:endParaRPr lang="en-US" dirty="0" smtClean="0"/>
+          </a:p>
+          <a:p>
+            <a:pPr lvl="1"/>
+            <a:r>
+              <a:rPr lang="en-US" dirty="0" smtClean="0">
+                <a:hlinkClick r:id="rId3"/>
+              </a:rPr>
+              <a:t>DEMO</a:t>
             </a:r>
             <a:endParaRPr lang="en-US" dirty="0"/>
           </a:p>
@@ -9603,10 +9641,617 @@
       <p:transition spd="slow"/>
     </mc:Fallback>
   </mc:AlternateContent>
+  <p:timing>
+    <p:tnLst>
+      <p:par>
+        <p:cTn id="1" dur="indefinite" restart="never" nodeType="tmRoot"/>
+      </p:par>
+    </p:tnLst>
+  </p:timing>
 </p:sld>
 </file>
 
 <file path=ppt/slides/slide18.xml><?xml version="1.0" encoding="utf-8"?>
+<p:sld xmlns:a="http://schemas.openxmlformats.org/drawingml/2006/main" xmlns:r="http://schemas.openxmlformats.org/officeDocument/2006/relationships" xmlns:p="http://schemas.openxmlformats.org/presentationml/2006/main">
+  <p:cSld>
+    <p:spTree>
+      <p:nvGrpSpPr>
+        <p:cNvPr id="1" name=""/>
+        <p:cNvGrpSpPr/>
+        <p:nvPr/>
+      </p:nvGrpSpPr>
+      <p:grpSpPr>
+        <a:xfrm>
+          <a:off x="0" y="0"/>
+          <a:ext cx="0" cy="0"/>
+          <a:chOff x="0" y="0"/>
+          <a:chExt cx="0" cy="0"/>
+        </a:xfrm>
+      </p:grpSpPr>
+      <p:sp>
+        <p:nvSpPr>
+          <p:cNvPr id="6" name="Title 5"/>
+          <p:cNvSpPr>
+            <a:spLocks noGrp="1"/>
+          </p:cNvSpPr>
+          <p:nvPr>
+            <p:ph type="title"/>
+          </p:nvPr>
+        </p:nvSpPr>
+        <p:spPr>
+          <a:xfrm>
+            <a:off x="1484311" y="166256"/>
+            <a:ext cx="10018713" cy="2272144"/>
+          </a:xfrm>
+        </p:spPr>
+        <p:txBody>
+          <a:bodyPr/>
+          <a:lstStyle/>
+          <a:p>
+            <a:r>
+              <a:rPr lang="en-US" dirty="0" smtClean="0"/>
+              <a:t>$.ajax()</a:t>
+            </a:r>
+            <a:endParaRPr lang="en-US" i="1" dirty="0">
+              <a:solidFill>
+                <a:schemeClr val="accent6">
+                  <a:lumMod val="75000"/>
+                </a:schemeClr>
+              </a:solidFill>
+            </a:endParaRPr>
+          </a:p>
+        </p:txBody>
+      </p:sp>
+      <p:pic>
+        <p:nvPicPr>
+          <p:cNvPr id="7" name="Picture 6"/>
+          <p:cNvPicPr>
+            <a:picLocks noChangeAspect="1"/>
+          </p:cNvPicPr>
+          <p:nvPr/>
+        </p:nvPicPr>
+        <p:blipFill>
+          <a:blip r:embed="rId2">
+            <a:extLst>
+              <a:ext uri="{28A0092B-C50C-407E-A947-70E740481C1C}">
+                <a14:useLocalDpi xmlns:a14="http://schemas.microsoft.com/office/drawing/2010/main" val="0"/>
+              </a:ext>
+            </a:extLst>
+          </a:blip>
+          <a:stretch>
+            <a:fillRect/>
+          </a:stretch>
+        </p:blipFill>
+        <p:spPr>
+          <a:xfrm>
+            <a:off x="4112417" y="1943677"/>
+            <a:ext cx="4762500" cy="4762500"/>
+          </a:xfrm>
+          <a:prstGeom prst="rect">
+            <a:avLst/>
+          </a:prstGeom>
+        </p:spPr>
+      </p:pic>
+    </p:spTree>
+    <p:extLst>
+      <p:ext uri="{BB962C8B-B14F-4D97-AF65-F5344CB8AC3E}">
+        <p14:creationId xmlns:p14="http://schemas.microsoft.com/office/powerpoint/2010/main" val="1371861528"/>
+      </p:ext>
+    </p:extLst>
+  </p:cSld>
+  <p:clrMapOvr>
+    <a:masterClrMapping/>
+  </p:clrMapOvr>
+  <mc:AlternateContent xmlns:mc="http://schemas.openxmlformats.org/markup-compatibility/2006" xmlns:p14="http://schemas.microsoft.com/office/powerpoint/2010/main">
+    <mc:Choice Requires="p14">
+      <p:transition spd="slow" p14:dur="2000"/>
+    </mc:Choice>
+    <mc:Fallback xmlns="">
+      <p:transition spd="slow"/>
+    </mc:Fallback>
+  </mc:AlternateContent>
+  <p:timing>
+    <p:tnLst>
+      <p:par>
+        <p:cTn id="1" dur="indefinite" restart="never" nodeType="tmRoot"/>
+      </p:par>
+    </p:tnLst>
+  </p:timing>
+</p:sld>
+</file>
+
+<file path=ppt/slides/slide19.xml><?xml version="1.0" encoding="utf-8"?>
+<p:sld xmlns:a="http://schemas.openxmlformats.org/drawingml/2006/main" xmlns:r="http://schemas.openxmlformats.org/officeDocument/2006/relationships" xmlns:p="http://schemas.openxmlformats.org/presentationml/2006/main">
+  <p:cSld>
+    <p:spTree>
+      <p:nvGrpSpPr>
+        <p:cNvPr id="1" name=""/>
+        <p:cNvGrpSpPr/>
+        <p:nvPr/>
+      </p:nvGrpSpPr>
+      <p:grpSpPr>
+        <a:xfrm>
+          <a:off x="0" y="0"/>
+          <a:ext cx="0" cy="0"/>
+          <a:chOff x="0" y="0"/>
+          <a:chExt cx="0" cy="0"/>
+        </a:xfrm>
+      </p:grpSpPr>
+      <p:sp>
+        <p:nvSpPr>
+          <p:cNvPr id="2" name="Title 1"/>
+          <p:cNvSpPr>
+            <a:spLocks noGrp="1"/>
+          </p:cNvSpPr>
+          <p:nvPr>
+            <p:ph type="title"/>
+          </p:nvPr>
+        </p:nvSpPr>
+        <p:spPr/>
+        <p:txBody>
+          <a:bodyPr/>
+          <a:lstStyle/>
+          <a:p>
+            <a:r>
+              <a:rPr lang="en-US" i="1" dirty="0" smtClean="0">
+                <a:solidFill>
+                  <a:schemeClr val="accent6">
+                    <a:lumMod val="75000"/>
+                  </a:schemeClr>
+                </a:solidFill>
+              </a:rPr>
+              <a:t>$.load(</a:t>
+            </a:r>
+            <a:r>
+              <a:rPr lang="en-US" i="1" dirty="0" err="1">
+                <a:solidFill>
+                  <a:schemeClr val="accent6">
+                    <a:lumMod val="75000"/>
+                  </a:schemeClr>
+                </a:solidFill>
+              </a:rPr>
+              <a:t>url</a:t>
+            </a:r>
+            <a:r>
+              <a:rPr lang="en-US" i="1" dirty="0">
+                <a:solidFill>
+                  <a:schemeClr val="accent6">
+                    <a:lumMod val="75000"/>
+                  </a:schemeClr>
+                </a:solidFill>
+              </a:rPr>
+              <a:t> [, data ] [, complete </a:t>
+            </a:r>
+            <a:r>
+              <a:rPr lang="en-US" i="1" dirty="0" smtClean="0">
+                <a:solidFill>
+                  <a:schemeClr val="accent6">
+                    <a:lumMod val="75000"/>
+                  </a:schemeClr>
+                </a:solidFill>
+              </a:rPr>
+              <a:t>])</a:t>
+            </a:r>
+            <a:endParaRPr lang="en-US" i="1" dirty="0">
+              <a:solidFill>
+                <a:schemeClr val="accent6">
+                  <a:lumMod val="75000"/>
+                </a:schemeClr>
+              </a:solidFill>
+            </a:endParaRPr>
+          </a:p>
+        </p:txBody>
+      </p:sp>
+      <p:sp>
+        <p:nvSpPr>
+          <p:cNvPr id="3" name="Content Placeholder 2"/>
+          <p:cNvSpPr>
+            <a:spLocks noGrp="1"/>
+          </p:cNvSpPr>
+          <p:nvPr>
+            <p:ph idx="1"/>
+          </p:nvPr>
+        </p:nvSpPr>
+        <p:spPr/>
+        <p:txBody>
+          <a:bodyPr/>
+          <a:lstStyle/>
+          <a:p>
+            <a:r>
+              <a:rPr lang="bg-BG" dirty="0" smtClean="0"/>
+              <a:t>Използва се за асинхронно зареждане на </a:t>
+            </a:r>
+            <a:r>
+              <a:rPr lang="en-US" dirty="0" smtClean="0"/>
+              <a:t>HTML</a:t>
+            </a:r>
+            <a:r>
+              <a:rPr lang="bg-BG" dirty="0" smtClean="0"/>
+              <a:t>-и</a:t>
+            </a:r>
+          </a:p>
+          <a:p>
+            <a:r>
+              <a:rPr lang="bg-BG" dirty="0" smtClean="0"/>
+              <a:t>Помага за динамичен </a:t>
+            </a:r>
+            <a:r>
+              <a:rPr lang="en-US" dirty="0" smtClean="0"/>
+              <a:t>UI </a:t>
+            </a:r>
+            <a:r>
+              <a:rPr lang="bg-BG" dirty="0" smtClean="0"/>
+              <a:t>без да презареждаме цялата страница</a:t>
+            </a:r>
+          </a:p>
+          <a:p>
+            <a:r>
+              <a:rPr lang="bg-BG" dirty="0" smtClean="0"/>
+              <a:t>Параметри</a:t>
+            </a:r>
+          </a:p>
+          <a:p>
+            <a:pPr lvl="1"/>
+            <a:r>
+              <a:rPr lang="en-US" dirty="0" err="1" smtClean="0"/>
+              <a:t>url</a:t>
+            </a:r>
+            <a:r>
+              <a:rPr lang="en-US" dirty="0" smtClean="0"/>
+              <a:t> -&gt;</a:t>
+            </a:r>
+            <a:r>
+              <a:rPr lang="bg-BG" dirty="0" smtClean="0"/>
+              <a:t> мястото, където се намира въпросния </a:t>
+            </a:r>
+            <a:r>
+              <a:rPr lang="en-US" dirty="0" smtClean="0"/>
+              <a:t>HTML</a:t>
+            </a:r>
+          </a:p>
+          <a:p>
+            <a:pPr lvl="1"/>
+            <a:r>
+              <a:rPr lang="en-US" dirty="0" smtClean="0"/>
+              <a:t>Data -&gt;</a:t>
+            </a:r>
+            <a:r>
+              <a:rPr lang="bg-BG" dirty="0" smtClean="0"/>
+              <a:t> обект, който може да бъде изпратен до сървъра</a:t>
+            </a:r>
+          </a:p>
+          <a:p>
+            <a:pPr lvl="1"/>
+            <a:r>
+              <a:rPr lang="en-US" dirty="0" smtClean="0"/>
+              <a:t>Complete -&gt;</a:t>
+            </a:r>
+            <a:r>
+              <a:rPr lang="bg-BG" dirty="0" smtClean="0"/>
+              <a:t> </a:t>
+            </a:r>
+            <a:r>
+              <a:rPr lang="en-US" dirty="0" smtClean="0"/>
+              <a:t>callback</a:t>
+            </a:r>
+            <a:r>
+              <a:rPr lang="bg-BG" dirty="0" smtClean="0"/>
+              <a:t> функция, която се изпълнява, след като вече е зареден </a:t>
+            </a:r>
+            <a:r>
+              <a:rPr lang="en-US" dirty="0" smtClean="0"/>
+              <a:t>html</a:t>
+            </a:r>
+            <a:endParaRPr lang="en-US" dirty="0"/>
+          </a:p>
+        </p:txBody>
+      </p:sp>
+    </p:spTree>
+    <p:extLst>
+      <p:ext uri="{BB962C8B-B14F-4D97-AF65-F5344CB8AC3E}">
+        <p14:creationId xmlns:p14="http://schemas.microsoft.com/office/powerpoint/2010/main" val="4165472616"/>
+      </p:ext>
+    </p:extLst>
+  </p:cSld>
+  <p:clrMapOvr>
+    <a:masterClrMapping/>
+  </p:clrMapOvr>
+  <mc:AlternateContent xmlns:mc="http://schemas.openxmlformats.org/markup-compatibility/2006" xmlns:p14="http://schemas.microsoft.com/office/powerpoint/2010/main">
+    <mc:Choice Requires="p14">
+      <p:transition spd="slow" p14:dur="2000"/>
+    </mc:Choice>
+    <mc:Fallback xmlns="">
+      <p:transition spd="slow"/>
+    </mc:Fallback>
+  </mc:AlternateContent>
+  <p:timing>
+    <p:tnLst>
+      <p:par>
+        <p:cTn id="1" dur="indefinite" restart="never" nodeType="tmRoot"/>
+      </p:par>
+    </p:tnLst>
+  </p:timing>
+</p:sld>
+</file>
+
+<file path=ppt/slides/slide2.xml><?xml version="1.0" encoding="utf-8"?>
+<p:sld xmlns:a="http://schemas.openxmlformats.org/drawingml/2006/main" xmlns:r="http://schemas.openxmlformats.org/officeDocument/2006/relationships" xmlns:p="http://schemas.openxmlformats.org/presentationml/2006/main">
+  <p:cSld>
+    <p:spTree>
+      <p:nvGrpSpPr>
+        <p:cNvPr id="1" name=""/>
+        <p:cNvGrpSpPr/>
+        <p:nvPr/>
+      </p:nvGrpSpPr>
+      <p:grpSpPr>
+        <a:xfrm>
+          <a:off x="0" y="0"/>
+          <a:ext cx="0" cy="0"/>
+          <a:chOff x="0" y="0"/>
+          <a:chExt cx="0" cy="0"/>
+        </a:xfrm>
+      </p:grpSpPr>
+      <p:sp>
+        <p:nvSpPr>
+          <p:cNvPr id="2" name="Title 1"/>
+          <p:cNvSpPr>
+            <a:spLocks noGrp="1"/>
+          </p:cNvSpPr>
+          <p:nvPr>
+            <p:ph type="title"/>
+          </p:nvPr>
+        </p:nvSpPr>
+        <p:spPr/>
+        <p:txBody>
+          <a:bodyPr/>
+          <a:lstStyle/>
+          <a:p>
+            <a:r>
+              <a:rPr lang="bg-BG" dirty="0" smtClean="0"/>
+              <a:t>Асинхронност в </a:t>
+            </a:r>
+            <a:r>
+              <a:rPr lang="en-US" dirty="0" smtClean="0"/>
+              <a:t>JS</a:t>
+            </a:r>
+            <a:endParaRPr lang="en-US" dirty="0"/>
+          </a:p>
+        </p:txBody>
+      </p:sp>
+      <p:sp>
+        <p:nvSpPr>
+          <p:cNvPr id="3" name="Content Placeholder 2"/>
+          <p:cNvSpPr>
+            <a:spLocks noGrp="1"/>
+          </p:cNvSpPr>
+          <p:nvPr>
+            <p:ph idx="1"/>
+          </p:nvPr>
+        </p:nvSpPr>
+        <p:spPr>
+          <a:xfrm>
+            <a:off x="1484311" y="2032001"/>
+            <a:ext cx="10018713" cy="4287982"/>
+          </a:xfrm>
+        </p:spPr>
+        <p:txBody>
+          <a:bodyPr>
+            <a:normAutofit/>
+          </a:bodyPr>
+          <a:lstStyle/>
+          <a:p>
+            <a:r>
+              <a:rPr lang="en-US" dirty="0" smtClean="0"/>
+              <a:t>JS</a:t>
+            </a:r>
+            <a:r>
+              <a:rPr lang="bg-BG" dirty="0" smtClean="0"/>
+              <a:t> се изпълнява само на 1 процесорна нишка</a:t>
+            </a:r>
+          </a:p>
+          <a:p>
+            <a:pPr lvl="1"/>
+            <a:r>
+              <a:rPr lang="bg-BG" dirty="0" smtClean="0"/>
+              <a:t>Операции, които отнемат повече време, могат да блокират процеса</a:t>
+            </a:r>
+          </a:p>
+          <a:p>
+            <a:r>
+              <a:rPr lang="bg-BG" dirty="0" smtClean="0"/>
+              <a:t>В </a:t>
+            </a:r>
+            <a:r>
+              <a:rPr lang="en-US" dirty="0" smtClean="0"/>
+              <a:t>JS</a:t>
+            </a:r>
+            <a:r>
+              <a:rPr lang="bg-BG" dirty="0" smtClean="0"/>
+              <a:t> може да се използва асинхронност</a:t>
+            </a:r>
+          </a:p>
+          <a:p>
+            <a:pPr lvl="1"/>
+            <a:r>
+              <a:rPr lang="bg-BG" dirty="0" smtClean="0"/>
+              <a:t>Дълги операции се разделят на по-къси</a:t>
+            </a:r>
+          </a:p>
+          <a:p>
+            <a:pPr lvl="1"/>
+            <a:r>
+              <a:rPr lang="bg-BG" dirty="0" smtClean="0"/>
+              <a:t>Отлагаме изпъленението на дадени парчета код</a:t>
+            </a:r>
+          </a:p>
+          <a:p>
+            <a:r>
+              <a:rPr lang="bg-BG" dirty="0" smtClean="0"/>
+              <a:t>Използват се т.нар</a:t>
+            </a:r>
+            <a:r>
+              <a:rPr lang="en-US" dirty="0" smtClean="0"/>
+              <a:t> callbacks</a:t>
+            </a:r>
+          </a:p>
+          <a:p>
+            <a:pPr lvl="1"/>
+            <a:r>
+              <a:rPr lang="bg-BG" dirty="0" smtClean="0"/>
+              <a:t>Функции, които да се изпълнят на даден етап</a:t>
+            </a:r>
+          </a:p>
+          <a:p>
+            <a:r>
+              <a:rPr lang="bg-BG" dirty="0" smtClean="0"/>
+              <a:t>Асинхронност в браузърите – </a:t>
+            </a:r>
+            <a:r>
+              <a:rPr lang="en-US" dirty="0" smtClean="0"/>
+              <a:t>AJAX, Geolocation, CSS3 Animations….</a:t>
+            </a:r>
+            <a:endParaRPr lang="bg-BG" dirty="0" smtClean="0"/>
+          </a:p>
+        </p:txBody>
+      </p:sp>
+    </p:spTree>
+    <p:extLst>
+      <p:ext uri="{BB962C8B-B14F-4D97-AF65-F5344CB8AC3E}">
+        <p14:creationId xmlns:p14="http://schemas.microsoft.com/office/powerpoint/2010/main" val="3386868017"/>
+      </p:ext>
+    </p:extLst>
+  </p:cSld>
+  <p:clrMapOvr>
+    <a:masterClrMapping/>
+  </p:clrMapOvr>
+  <mc:AlternateContent xmlns:mc="http://schemas.openxmlformats.org/markup-compatibility/2006" xmlns:p14="http://schemas.microsoft.com/office/powerpoint/2010/main">
+    <mc:Choice Requires="p14">
+      <p:transition spd="slow" p14:dur="2000"/>
+    </mc:Choice>
+    <mc:Fallback xmlns="">
+      <p:transition spd="slow"/>
+    </mc:Fallback>
+  </mc:AlternateContent>
+  <p:timing>
+    <p:tnLst>
+      <p:par>
+        <p:cTn id="1" dur="indefinite" restart="never" nodeType="tmRoot"/>
+      </p:par>
+    </p:tnLst>
+  </p:timing>
+</p:sld>
+</file>
+
+<file path=ppt/slides/slide20.xml><?xml version="1.0" encoding="utf-8"?>
+<p:sld xmlns:a="http://schemas.openxmlformats.org/drawingml/2006/main" xmlns:r="http://schemas.openxmlformats.org/officeDocument/2006/relationships" xmlns:p="http://schemas.openxmlformats.org/presentationml/2006/main">
+  <p:cSld>
+    <p:spTree>
+      <p:nvGrpSpPr>
+        <p:cNvPr id="1" name=""/>
+        <p:cNvGrpSpPr/>
+        <p:nvPr/>
+      </p:nvGrpSpPr>
+      <p:grpSpPr>
+        <a:xfrm>
+          <a:off x="0" y="0"/>
+          <a:ext cx="0" cy="0"/>
+          <a:chOff x="0" y="0"/>
+          <a:chExt cx="0" cy="0"/>
+        </a:xfrm>
+      </p:grpSpPr>
+      <p:sp>
+        <p:nvSpPr>
+          <p:cNvPr id="6" name="Title 5"/>
+          <p:cNvSpPr>
+            <a:spLocks noGrp="1"/>
+          </p:cNvSpPr>
+          <p:nvPr>
+            <p:ph type="title"/>
+          </p:nvPr>
+        </p:nvSpPr>
+        <p:spPr>
+          <a:xfrm>
+            <a:off x="1484311" y="166256"/>
+            <a:ext cx="10018713" cy="2272144"/>
+          </a:xfrm>
+        </p:spPr>
+        <p:txBody>
+          <a:bodyPr/>
+          <a:lstStyle/>
+          <a:p>
+            <a:r>
+              <a:rPr lang="en-US" dirty="0" smtClean="0"/>
+              <a:t>$.load()</a:t>
+            </a:r>
+            <a:endParaRPr lang="en-US" i="1" dirty="0">
+              <a:solidFill>
+                <a:schemeClr val="accent6">
+                  <a:lumMod val="75000"/>
+                </a:schemeClr>
+              </a:solidFill>
+            </a:endParaRPr>
+          </a:p>
+        </p:txBody>
+      </p:sp>
+      <p:pic>
+        <p:nvPicPr>
+          <p:cNvPr id="7" name="Picture 6"/>
+          <p:cNvPicPr>
+            <a:picLocks noChangeAspect="1"/>
+          </p:cNvPicPr>
+          <p:nvPr/>
+        </p:nvPicPr>
+        <p:blipFill>
+          <a:blip r:embed="rId2">
+            <a:extLst>
+              <a:ext uri="{28A0092B-C50C-407E-A947-70E740481C1C}">
+                <a14:useLocalDpi xmlns:a14="http://schemas.microsoft.com/office/drawing/2010/main" val="0"/>
+              </a:ext>
+            </a:extLst>
+          </a:blip>
+          <a:stretch>
+            <a:fillRect/>
+          </a:stretch>
+        </p:blipFill>
+        <p:spPr>
+          <a:xfrm>
+            <a:off x="4112417" y="1943677"/>
+            <a:ext cx="4762500" cy="4762500"/>
+          </a:xfrm>
+          <a:prstGeom prst="rect">
+            <a:avLst/>
+          </a:prstGeom>
+        </p:spPr>
+      </p:pic>
+    </p:spTree>
+    <p:extLst>
+      <p:ext uri="{BB962C8B-B14F-4D97-AF65-F5344CB8AC3E}">
+        <p14:creationId xmlns:p14="http://schemas.microsoft.com/office/powerpoint/2010/main" val="172810910"/>
+      </p:ext>
+    </p:extLst>
+  </p:cSld>
+  <p:clrMapOvr>
+    <a:masterClrMapping/>
+  </p:clrMapOvr>
+  <mc:AlternateContent xmlns:mc="http://schemas.openxmlformats.org/markup-compatibility/2006" xmlns:p14="http://schemas.microsoft.com/office/powerpoint/2010/main">
+    <mc:Choice Requires="p14">
+      <p:transition spd="slow" p14:dur="2000"/>
+    </mc:Choice>
+    <mc:Fallback xmlns="">
+      <p:transition spd="slow"/>
+    </mc:Fallback>
+  </mc:AlternateContent>
+  <p:timing>
+    <p:tnLst>
+      <p:par>
+        <p:cTn id="1" dur="indefinite" restart="never" nodeType="tmRoot"/>
+      </p:par>
+    </p:tnLst>
+  </p:timing>
+</p:sld>
+</file>
+
+<file path=ppt/slides/slide21.xml><?xml version="1.0" encoding="utf-8"?>
 <p:sld xmlns:a="http://schemas.openxmlformats.org/drawingml/2006/main" xmlns:r="http://schemas.openxmlformats.org/officeDocument/2006/relationships" xmlns:p="http://schemas.openxmlformats.org/presentationml/2006/main">
   <p:cSld>
     <p:spTree>
@@ -9680,7 +10325,7 @@
 </p:sld>
 </file>
 
-<file path=ppt/slides/slide19.xml><?xml version="1.0" encoding="utf-8"?>
+<file path=ppt/slides/slide22.xml><?xml version="1.0" encoding="utf-8"?>
 <p:sld xmlns:a="http://schemas.openxmlformats.org/drawingml/2006/main" xmlns:r="http://schemas.openxmlformats.org/officeDocument/2006/relationships" xmlns:p="http://schemas.openxmlformats.org/presentationml/2006/main">
   <p:cSld>
     <p:spTree>
@@ -9738,7 +10383,7 @@
         </p:spPr>
         <p:txBody>
           <a:bodyPr anchor="ctr" anchorCtr="0">
-            <a:normAutofit fontScale="92500" lnSpcReduction="10000"/>
+            <a:normAutofit/>
           </a:bodyPr>
           <a:lstStyle/>
           <a:p>
@@ -9756,98 +10401,95 @@
             </a:r>
             <a:r>
               <a:rPr lang="bg-BG" dirty="0" smtClean="0"/>
-              <a:t> код, който по съществуващ </a:t>
+              <a:t> код, който </a:t>
+            </a:r>
+            <a:r>
+              <a:rPr lang="bg-BG" dirty="0" smtClean="0"/>
+              <a:t>по даден </a:t>
+            </a:r>
+            <a:r>
+              <a:rPr lang="en-US" dirty="0"/>
+              <a:t>URL: </a:t>
+            </a:r>
+            <a:r>
+              <a:rPr lang="en-US" dirty="0">
+                <a:hlinkClick r:id="rId2"/>
+              </a:rPr>
+              <a:t>https://</a:t>
+            </a:r>
+            <a:r>
+              <a:rPr lang="en-US" dirty="0" smtClean="0">
+                <a:hlinkClick r:id="rId2"/>
+              </a:rPr>
+              <a:t>api.themoviedb.org/3/movie/550?api_key=ee4147bedd685cdebb23042532c92117</a:t>
+            </a:r>
+            <a:endParaRPr lang="en-US" dirty="0" smtClean="0"/>
+          </a:p>
+          <a:p>
+            <a:pPr lvl="1"/>
+            <a:r>
+              <a:rPr lang="bg-BG" dirty="0" smtClean="0"/>
+              <a:t>Да направи </a:t>
             </a:r>
             <a:r>
               <a:rPr lang="en-US" dirty="0" smtClean="0"/>
-              <a:t>HTML</a:t>
+              <a:t>GET</a:t>
+            </a:r>
+            <a:r>
+              <a:rPr lang="bg-BG" dirty="0" smtClean="0"/>
+              <a:t> заявка</a:t>
+            </a:r>
+          </a:p>
+          <a:p>
+            <a:pPr lvl="1"/>
+            <a:r>
+              <a:rPr lang="bg-BG" dirty="0" smtClean="0"/>
+              <a:t>Да  визуализира на база получените данни</a:t>
+            </a:r>
+          </a:p>
+          <a:p>
+            <a:pPr lvl="2"/>
+            <a:r>
+              <a:rPr lang="bg-BG" dirty="0" smtClean="0"/>
+              <a:t>Заглавието на филма</a:t>
+            </a:r>
+          </a:p>
+          <a:p>
+            <a:pPr lvl="2"/>
+            <a:r>
+              <a:rPr lang="bg-BG" dirty="0" smtClean="0"/>
+              <a:t>Описанието </a:t>
+            </a:r>
+            <a:r>
+              <a:rPr lang="en-US" dirty="0" smtClean="0"/>
+              <a:t>/overview/</a:t>
+            </a:r>
+            <a:r>
+              <a:rPr lang="bg-BG" dirty="0" smtClean="0"/>
+              <a:t> на филма</a:t>
+            </a:r>
+          </a:p>
+          <a:p>
+            <a:pPr lvl="2"/>
+            <a:r>
+              <a:rPr lang="bg-BG" dirty="0" smtClean="0"/>
+              <a:t>Дата на издаване /</a:t>
+            </a:r>
+            <a:r>
+              <a:rPr lang="en-US" dirty="0" smtClean="0"/>
+              <a:t>release date/</a:t>
             </a:r>
             <a:endParaRPr lang="bg-BG" dirty="0" smtClean="0"/>
           </a:p>
           <a:p>
-            <a:pPr lvl="1"/>
-            <a:r>
-              <a:rPr lang="bg-BG" dirty="0" smtClean="0"/>
-              <a:t>Да намира бутон с </a:t>
+            <a:pPr lvl="2"/>
+            <a:r>
+              <a:rPr lang="bg-BG" dirty="0" smtClean="0"/>
+              <a:t>Линк към страницата на филма /</a:t>
             </a:r>
             <a:r>
               <a:rPr lang="en-US" dirty="0" smtClean="0"/>
-              <a:t>id=“clickable” </a:t>
-            </a:r>
-            <a:r>
-              <a:rPr lang="bg-BG" dirty="0" smtClean="0"/>
-              <a:t>и да се закача за събитието </a:t>
-            </a:r>
-            <a:r>
-              <a:rPr lang="en-US" dirty="0" smtClean="0"/>
-              <a:t>‘click’</a:t>
-            </a:r>
-            <a:endParaRPr lang="bg-BG" dirty="0" smtClean="0"/>
-          </a:p>
-          <a:p>
-            <a:pPr lvl="1"/>
-            <a:r>
-              <a:rPr lang="bg-BG" dirty="0" smtClean="0"/>
-              <a:t>При клик на този бутон да се сменя цвета на фона на 1вия &lt;</a:t>
-            </a:r>
-            <a:r>
-              <a:rPr lang="en-US" dirty="0" smtClean="0"/>
-              <a:t>div /&gt;</a:t>
-            </a:r>
-            <a:r>
-              <a:rPr lang="bg-BG" dirty="0" smtClean="0"/>
-              <a:t> елемент</a:t>
-            </a:r>
-          </a:p>
-          <a:p>
-            <a:pPr lvl="1"/>
-            <a:r>
-              <a:rPr lang="bg-BG" dirty="0" smtClean="0"/>
-              <a:t>Да се добавят още 2 бутона + и  -, като при клик на + да се увеличава шрифта на текста, а при клик на – да се намалява шрифта на текста</a:t>
-            </a:r>
-          </a:p>
-          <a:p>
-            <a:pPr marL="457200" indent="-457200">
-              <a:buFont typeface="+mj-lt"/>
-              <a:buAutoNum type="arabicPeriod"/>
-            </a:pPr>
-            <a:r>
-              <a:rPr lang="bg-BG" dirty="0" smtClean="0"/>
-              <a:t>Да се напише </a:t>
-            </a:r>
-            <a:r>
-              <a:rPr lang="en-US" dirty="0" smtClean="0"/>
-              <a:t>JS</a:t>
-            </a:r>
-            <a:r>
-              <a:rPr lang="en-US" dirty="0"/>
-              <a:t> </a:t>
-            </a:r>
-            <a:r>
-              <a:rPr lang="bg-BG" dirty="0" smtClean="0"/>
-              <a:t>код, който да прави валидация на дадена </a:t>
-            </a:r>
-            <a:r>
-              <a:rPr lang="en-US" dirty="0" smtClean="0"/>
-              <a:t>HTML</a:t>
-            </a:r>
-            <a:r>
-              <a:rPr lang="bg-BG" dirty="0" smtClean="0"/>
-              <a:t> форма и да извежда на страницата коректни съобщения. Формата има полета за име и години</a:t>
-            </a:r>
-          </a:p>
-          <a:p>
-            <a:pPr lvl="1"/>
-            <a:r>
-              <a:rPr lang="bg-BG" dirty="0" smtClean="0"/>
-              <a:t>Името може да е само малки или главни латински букви, други символи не са допустими</a:t>
-            </a:r>
-          </a:p>
-          <a:p>
-            <a:pPr lvl="1"/>
-            <a:r>
-              <a:rPr lang="bg-BG" dirty="0" smtClean="0"/>
-              <a:t>Годините са цяло число в интервала 18-54</a:t>
+              <a:t>homepage/</a:t>
             </a:r>
             <a:endParaRPr lang="bg-BG" dirty="0"/>
           </a:p>
@@ -9885,174 +10527,6 @@
     <p:extLst>
       <p:ext uri="{BB962C8B-B14F-4D97-AF65-F5344CB8AC3E}">
         <p14:creationId xmlns:p14="http://schemas.microsoft.com/office/powerpoint/2010/main" val="2161688977"/>
-      </p:ext>
-    </p:extLst>
-  </p:cSld>
-  <p:clrMapOvr>
-    <a:masterClrMapping/>
-  </p:clrMapOvr>
-  <mc:AlternateContent xmlns:mc="http://schemas.openxmlformats.org/markup-compatibility/2006" xmlns:p14="http://schemas.microsoft.com/office/powerpoint/2010/main">
-    <mc:Choice Requires="p14">
-      <p:transition spd="slow" p14:dur="2000"/>
-    </mc:Choice>
-    <mc:Fallback xmlns="">
-      <p:transition spd="slow"/>
-    </mc:Fallback>
-  </mc:AlternateContent>
-  <p:timing>
-    <p:tnLst>
-      <p:par>
-        <p:cTn id="1" dur="indefinite" restart="never" nodeType="tmRoot"/>
-      </p:par>
-    </p:tnLst>
-  </p:timing>
-</p:sld>
-</file>
-
-<file path=ppt/slides/slide2.xml><?xml version="1.0" encoding="utf-8"?>
-<p:sld xmlns:a="http://schemas.openxmlformats.org/drawingml/2006/main" xmlns:r="http://schemas.openxmlformats.org/officeDocument/2006/relationships" xmlns:p="http://schemas.openxmlformats.org/presentationml/2006/main">
-  <p:cSld>
-    <p:spTree>
-      <p:nvGrpSpPr>
-        <p:cNvPr id="1" name=""/>
-        <p:cNvGrpSpPr/>
-        <p:nvPr/>
-      </p:nvGrpSpPr>
-      <p:grpSpPr>
-        <a:xfrm>
-          <a:off x="0" y="0"/>
-          <a:ext cx="0" cy="0"/>
-          <a:chOff x="0" y="0"/>
-          <a:chExt cx="0" cy="0"/>
-        </a:xfrm>
-      </p:grpSpPr>
-      <p:sp>
-        <p:nvSpPr>
-          <p:cNvPr id="2" name="Title 1"/>
-          <p:cNvSpPr>
-            <a:spLocks noGrp="1"/>
-          </p:cNvSpPr>
-          <p:nvPr>
-            <p:ph type="title"/>
-          </p:nvPr>
-        </p:nvSpPr>
-        <p:spPr/>
-        <p:txBody>
-          <a:bodyPr/>
-          <a:lstStyle/>
-          <a:p>
-            <a:r>
-              <a:rPr lang="bg-BG" dirty="0" smtClean="0"/>
-              <a:t>Асинхронност в </a:t>
-            </a:r>
-            <a:r>
-              <a:rPr lang="en-US" dirty="0" smtClean="0"/>
-              <a:t>JS</a:t>
-            </a:r>
-            <a:endParaRPr lang="en-US" dirty="0"/>
-          </a:p>
-        </p:txBody>
-      </p:sp>
-      <p:sp>
-        <p:nvSpPr>
-          <p:cNvPr id="3" name="Content Placeholder 2"/>
-          <p:cNvSpPr>
-            <a:spLocks noGrp="1"/>
-          </p:cNvSpPr>
-          <p:nvPr>
-            <p:ph idx="1"/>
-          </p:nvPr>
-        </p:nvSpPr>
-        <p:spPr>
-          <a:xfrm>
-            <a:off x="1484311" y="2032001"/>
-            <a:ext cx="10018713" cy="4287982"/>
-          </a:xfrm>
-        </p:spPr>
-        <p:txBody>
-          <a:bodyPr>
-            <a:normAutofit/>
-          </a:bodyPr>
-          <a:lstStyle/>
-          <a:p>
-            <a:r>
-              <a:rPr lang="en-US" dirty="0" smtClean="0"/>
-              <a:t>JS</a:t>
-            </a:r>
-            <a:r>
-              <a:rPr lang="bg-BG" dirty="0" smtClean="0"/>
-              <a:t> се изпълнява само на 1 процесорна нишка</a:t>
-            </a:r>
-          </a:p>
-          <a:p>
-            <a:pPr lvl="1"/>
-            <a:r>
-              <a:rPr lang="bg-BG" dirty="0" smtClean="0"/>
-              <a:t>Операции, които отнемат повече време, могат да блокират процеса</a:t>
-            </a:r>
-          </a:p>
-          <a:p>
-            <a:r>
-              <a:rPr lang="bg-BG" dirty="0" smtClean="0"/>
-              <a:t>В </a:t>
-            </a:r>
-            <a:r>
-              <a:rPr lang="en-US" dirty="0" smtClean="0"/>
-              <a:t>JS</a:t>
-            </a:r>
-            <a:r>
-              <a:rPr lang="bg-BG" dirty="0" smtClean="0"/>
-              <a:t> може да се използва асинхронност</a:t>
-            </a:r>
-          </a:p>
-          <a:p>
-            <a:pPr lvl="1"/>
-            <a:r>
-              <a:rPr lang="bg-BG" dirty="0" smtClean="0"/>
-              <a:t>Дълги операции се разделят на по-къси</a:t>
-            </a:r>
-          </a:p>
-          <a:p>
-            <a:pPr lvl="1"/>
-            <a:r>
-              <a:rPr lang="bg-BG" dirty="0" smtClean="0"/>
-              <a:t>Отлагаме изпъленението на дадени парчета код</a:t>
-            </a:r>
-          </a:p>
-          <a:p>
-            <a:r>
-              <a:rPr lang="bg-BG" dirty="0" smtClean="0"/>
-              <a:t>Използват се т.нар</a:t>
-            </a:r>
-            <a:r>
-              <a:rPr lang="en-US" dirty="0" smtClean="0"/>
-              <a:t> callbacks</a:t>
-            </a:r>
-          </a:p>
-          <a:p>
-            <a:pPr lvl="1"/>
-            <a:r>
-              <a:rPr lang="bg-BG" dirty="0" smtClean="0"/>
-              <a:t>Функции, които да се изпълнят на даден етап</a:t>
-            </a:r>
-          </a:p>
-          <a:p>
-            <a:r>
-              <a:rPr lang="bg-BG" dirty="0" smtClean="0"/>
-              <a:t>Асинхронност в браузърите – </a:t>
-            </a:r>
-            <a:r>
-              <a:rPr lang="en-US" dirty="0" smtClean="0"/>
-              <a:t>AJAX, Geolocation, CSS3 Animations….</a:t>
-            </a:r>
-            <a:endParaRPr lang="bg-BG" dirty="0" smtClean="0"/>
-          </a:p>
-        </p:txBody>
-      </p:sp>
-    </p:spTree>
-    <p:extLst>
-      <p:ext uri="{BB962C8B-B14F-4D97-AF65-F5344CB8AC3E}">
-        <p14:creationId xmlns:p14="http://schemas.microsoft.com/office/powerpoint/2010/main" val="3386868017"/>
       </p:ext>
     </p:extLst>
   </p:cSld>
@@ -10537,9 +11011,6 @@
               </a:rPr>
               <a:t>3000);</a:t>
             </a:r>
-            <a:endParaRPr lang="it-IT" sz="1800" dirty="0">
-              <a:effectLst/>
-            </a:endParaRPr>
           </a:p>
         </p:txBody>
       </p:sp>
@@ -10824,13 +11295,10 @@
               <a:t>fulfilled, resolved, </a:t>
             </a:r>
             <a:r>
-              <a:rPr lang="en-US" dirty="0" err="1" smtClean="0"/>
-              <a:t>succeded</a:t>
-            </a:r>
-            <a:r>
               <a:rPr lang="en-US" dirty="0" smtClean="0"/>
-              <a:t>)</a:t>
-            </a:r>
+              <a:t>succeeded)</a:t>
+            </a:r>
+            <a:endParaRPr lang="en-US" dirty="0" smtClean="0"/>
           </a:p>
           <a:p>
             <a:pPr lvl="1"/>

</xml_diff>